<commit_message>
gathering documents and ideas
</commit_message>
<xml_diff>
--- a/stop-checking-in-secrets.pptx
+++ b/stop-checking-in-secrets.pptx
@@ -105,6 +105,11 @@
       </a:defRPr>
     </a:lvl9pPr>
   </p:defaultTextStyle>
+  <p:extLst>
+    <p:ext uri="{EFAFB233-063F-42B5-8137-9DF3F51BA10A}">
+      <p15:sldGuideLst xmlns:p15="http://schemas.microsoft.com/office/powerpoint/2012/main"/>
+    </p:ext>
+  </p:extLst>
 </p:presentation>
 </file>
 
@@ -2296,7 +2301,7 @@
             <a:fld id="{A5B0A250-5CC0-1746-B209-08E8B0DAE6AF}" type="datetimeFigureOut">
               <a:rPr lang="en-US" smtClean="0"/>
               <a:pPr algn="l"/>
-              <a:t>8/29/2021</a:t>
+              <a:t>8/31/2021</a:t>
             </a:fld>
             <a:endParaRPr lang="en-US" dirty="0"/>
           </a:p>
@@ -3758,7 +3763,7 @@
           <a:p>
             <a:fld id="{A5B0A250-5CC0-1746-B209-08E8B0DAE6AF}" type="datetimeFigureOut">
               <a:rPr lang="en-US" smtClean="0"/>
-              <a:t>8/29/2021</a:t>
+              <a:t>8/31/2021</a:t>
             </a:fld>
             <a:endParaRPr lang="en-US" dirty="0"/>
           </a:p>
@@ -4688,7 +4693,7 @@
           <a:p>
             <a:fld id="{A5B0A250-5CC0-1746-B209-08E8B0DAE6AF}" type="datetimeFigureOut">
               <a:rPr lang="en-US" smtClean="0"/>
-              <a:t>8/29/2021</a:t>
+              <a:t>8/31/2021</a:t>
             </a:fld>
             <a:endParaRPr lang="en-US"/>
           </a:p>
@@ -6145,7 +6150,7 @@
           <a:p>
             <a:fld id="{A5B0A250-5CC0-1746-B209-08E8B0DAE6AF}" type="datetimeFigureOut">
               <a:rPr lang="en-US" smtClean="0"/>
-              <a:t>8/29/2021</a:t>
+              <a:t>8/31/2021</a:t>
             </a:fld>
             <a:endParaRPr lang="en-US" dirty="0"/>
           </a:p>
@@ -8501,7 +8506,7 @@
           <a:p>
             <a:fld id="{A5B0A250-5CC0-1746-B209-08E8B0DAE6AF}" type="datetimeFigureOut">
               <a:rPr lang="en-US" smtClean="0"/>
-              <a:t>8/29/2021</a:t>
+              <a:t>8/31/2021</a:t>
             </a:fld>
             <a:endParaRPr lang="en-US" dirty="0"/>
           </a:p>
@@ -9542,7 +9547,7 @@
           <a:p>
             <a:fld id="{A5B0A250-5CC0-1746-B209-08E8B0DAE6AF}" type="datetimeFigureOut">
               <a:rPr lang="en-US" smtClean="0"/>
-              <a:t>8/29/2021</a:t>
+              <a:t>8/31/2021</a:t>
             </a:fld>
             <a:endParaRPr lang="en-US" dirty="0"/>
           </a:p>
@@ -10755,7 +10760,7 @@
           <a:p>
             <a:fld id="{A5B0A250-5CC0-1746-B209-08E8B0DAE6AF}" type="datetimeFigureOut">
               <a:rPr lang="en-US" smtClean="0"/>
-              <a:t>8/29/2021</a:t>
+              <a:t>8/31/2021</a:t>
             </a:fld>
             <a:endParaRPr lang="en-US" dirty="0"/>
           </a:p>
@@ -11664,7 +11669,7 @@
           <a:p>
             <a:fld id="{A5B0A250-5CC0-1746-B209-08E8B0DAE6AF}" type="datetimeFigureOut">
               <a:rPr lang="en-US" smtClean="0"/>
-              <a:t>8/29/2021</a:t>
+              <a:t>8/31/2021</a:t>
             </a:fld>
             <a:endParaRPr lang="en-US" dirty="0"/>
           </a:p>
@@ -11823,7 +11828,7 @@
             <a:fld id="{A5B0A250-5CC0-1746-B209-08E8B0DAE6AF}" type="datetimeFigureOut">
               <a:rPr lang="en-US" smtClean="0"/>
               <a:pPr/>
-              <a:t>8/29/2021</a:t>
+              <a:t>8/31/2021</a:t>
             </a:fld>
             <a:endParaRPr lang="en-US" dirty="0"/>
           </a:p>
@@ -12806,7 +12811,7 @@
           <a:p>
             <a:fld id="{A5B0A250-5CC0-1746-B209-08E8B0DAE6AF}" type="datetimeFigureOut">
               <a:rPr lang="en-US" smtClean="0"/>
-              <a:t>8/29/2021</a:t>
+              <a:t>8/31/2021</a:t>
             </a:fld>
             <a:endParaRPr lang="en-US" dirty="0"/>
           </a:p>
@@ -13868,7 +13873,7 @@
           <a:p>
             <a:fld id="{A5B0A250-5CC0-1746-B209-08E8B0DAE6AF}" type="datetimeFigureOut">
               <a:rPr lang="en-US" smtClean="0"/>
-              <a:t>8/29/2021</a:t>
+              <a:t>8/31/2021</a:t>
             </a:fld>
             <a:endParaRPr lang="en-US" dirty="0"/>
           </a:p>
@@ -14156,7 +14161,7 @@
             <a:fld id="{A5B0A250-5CC0-1746-B209-08E8B0DAE6AF}" type="datetimeFigureOut">
               <a:rPr lang="en-US" smtClean="0"/>
               <a:pPr/>
-              <a:t>8/29/2021</a:t>
+              <a:t>8/31/2021</a:t>
             </a:fld>
             <a:endParaRPr lang="en-US" dirty="0"/>
           </a:p>
@@ -16053,6 +16058,14 @@
 <file path=ppt/slides/slide2.xml><?xml version="1.0" encoding="utf-8"?>
 <p:sld xmlns:a="http://schemas.openxmlformats.org/drawingml/2006/main" xmlns:r="http://schemas.openxmlformats.org/officeDocument/2006/relationships" xmlns:p="http://schemas.openxmlformats.org/presentationml/2006/main">
   <p:cSld>
+    <p:bg>
+      <p:bgPr>
+        <a:solidFill>
+          <a:schemeClr val="bg1"/>
+        </a:solidFill>
+        <a:effectLst/>
+      </p:bgPr>
+    </p:bg>
     <p:spTree>
       <p:nvGrpSpPr>
         <p:cNvPr id="1" name=""/>
@@ -16067,27 +16080,62 @@
           <a:chExt cx="0" cy="0"/>
         </a:xfrm>
       </p:grpSpPr>
-      <p:sp>
+      <p:sp useBgFill="1">
         <p:nvSpPr>
-          <p:cNvPr id="2" name="Title 1">
+          <p:cNvPr id="8" name="Rectangle 7">
             <a:extLst>
               <a:ext uri="{FF2B5EF4-FFF2-40B4-BE49-F238E27FC236}">
-                <a16:creationId xmlns:a16="http://schemas.microsoft.com/office/drawing/2014/main" id="{C8D1A2BF-87FA-4DC0-9C3D-3369BDAB2353}"/>
+                <a16:creationId xmlns:a16="http://schemas.microsoft.com/office/drawing/2014/main" id="{4EFE82FE-7465-AE46-88DF-34D347E83B84}"/>
+              </a:ext>
+              <a:ext uri="{C183D7F6-B498-43B3-948B-1728B52AA6E4}">
+                <adec:decorative xmlns:adec="http://schemas.microsoft.com/office/drawing/2017/decorative" val="1"/>
               </a:ext>
             </a:extLst>
           </p:cNvPr>
           <p:cNvSpPr>
-            <a:spLocks noGrp="1"/>
+            <a:spLocks noGrp="1" noRot="1" noChangeAspect="1" noMove="1" noResize="1" noEditPoints="1" noAdjustHandles="1" noChangeArrowheads="1" noChangeShapeType="1" noTextEdit="1"/>
           </p:cNvSpPr>
           <p:nvPr>
-            <p:ph type="title"/>
+            <p:extLst>
+              <p:ext uri="{386F3935-93C4-4BCD-93E2-E3B085C9AB24}">
+                <p16:designElem xmlns:p16="http://schemas.microsoft.com/office/powerpoint/2015/main" val="1"/>
+              </p:ext>
+            </p:extLst>
           </p:nvPr>
         </p:nvSpPr>
-        <p:spPr/>
+        <p:spPr>
+          <a:xfrm>
+            <a:off x="0" y="0"/>
+            <a:ext cx="12192000" cy="6858000"/>
+          </a:xfrm>
+          <a:prstGeom prst="rect">
+            <a:avLst/>
+          </a:prstGeom>
+          <a:ln>
+            <a:noFill/>
+          </a:ln>
+        </p:spPr>
+        <p:style>
+          <a:lnRef idx="2">
+            <a:schemeClr val="accent1">
+              <a:shade val="50000"/>
+            </a:schemeClr>
+          </a:lnRef>
+          <a:fillRef idx="1">
+            <a:schemeClr val="accent1"/>
+          </a:fillRef>
+          <a:effectRef idx="0">
+            <a:schemeClr val="accent1"/>
+          </a:effectRef>
+          <a:fontRef idx="minor">
+            <a:schemeClr val="lt1"/>
+          </a:fontRef>
+        </p:style>
         <p:txBody>
-          <a:bodyPr/>
+          <a:bodyPr rtlCol="0" anchor="ctr"/>
           <a:lstStyle/>
           <a:p>
+            <a:pPr algn="ctr"/>
             <a:endParaRPr lang="en-US"/>
           </a:p>
         </p:txBody>
@@ -16108,15 +16156,1036 @@
             <p:ph idx="1"/>
           </p:nvPr>
         </p:nvSpPr>
-        <p:spPr/>
+        <p:spPr>
+          <a:xfrm>
+            <a:off x="565150" y="155645"/>
+            <a:ext cx="10130224" cy="6575893"/>
+          </a:xfrm>
+        </p:spPr>
         <p:txBody>
-          <a:bodyPr/>
+          <a:bodyPr>
+            <a:normAutofit/>
+          </a:bodyPr>
           <a:lstStyle/>
           <a:p>
-            <a:endParaRPr lang="en-US"/>
+            <a:r>
+              <a:rPr lang="en-US" sz="900" dirty="0"/>
+              <a:t>Demo: low ceremony web service</a:t>
+            </a:r>
+          </a:p>
+          <a:p>
+            <a:pPr lvl="1"/>
+            <a:r>
+              <a:rPr lang="en-US" sz="900" dirty="0"/>
+              <a:t>Show how the </a:t>
+            </a:r>
+            <a:r>
+              <a:rPr lang="en-US" sz="900" dirty="0" err="1"/>
+              <a:t>Iconfiguration</a:t>
+            </a:r>
+            <a:r>
+              <a:rPr lang="en-US" sz="900" dirty="0"/>
+              <a:t> is already there</a:t>
+            </a:r>
+          </a:p>
+          <a:p>
+            <a:r>
+              <a:rPr lang="en-US" sz="900" dirty="0"/>
+              <a:t>Demo: worker</a:t>
+            </a:r>
+          </a:p>
+          <a:p>
+            <a:pPr lvl="1"/>
+            <a:r>
+              <a:rPr lang="en-US" sz="900" dirty="0"/>
+              <a:t>Show adding in User Secrets </a:t>
+            </a:r>
+          </a:p>
+          <a:p>
+            <a:pPr lvl="1"/>
+            <a:r>
+              <a:rPr lang="en-US" sz="900" dirty="0"/>
+              <a:t>Configuration Source</a:t>
+            </a:r>
+          </a:p>
+          <a:p>
+            <a:r>
+              <a:rPr lang="en-US" sz="900" dirty="0"/>
+              <a:t>Go over what is looked at in what order</a:t>
+            </a:r>
+          </a:p>
+          <a:p>
+            <a:r>
+              <a:rPr lang="en-US" sz="900" dirty="0"/>
+              <a:t>Demo: Show the wrong way </a:t>
+            </a:r>
+            <a:r>
+              <a:rPr lang="en-US" sz="900" dirty="0" err="1"/>
+              <a:t>todo</a:t>
+            </a:r>
+            <a:r>
+              <a:rPr lang="en-US" sz="900" dirty="0"/>
+              <a:t> it.</a:t>
+            </a:r>
+          </a:p>
+          <a:p>
+            <a:pPr lvl="1"/>
+            <a:r>
+              <a:rPr lang="en-US" sz="900" dirty="0"/>
+              <a:t>Git push, delete the branch, then get it back.</a:t>
+            </a:r>
+          </a:p>
+          <a:p>
+            <a:r>
+              <a:rPr lang="en-US" sz="900" dirty="0">
+                <a:hlinkClick r:id="rId2"/>
+              </a:rPr>
+              <a:t>Safe storage of app secrets in development in ASP.NET Core | Microsoft Docs</a:t>
+            </a:r>
+            <a:endParaRPr lang="en-US" sz="900" dirty="0"/>
+          </a:p>
+          <a:p>
+            <a:r>
+              <a:rPr lang="en-US" sz="900" dirty="0"/>
+              <a:t>Show the command line for setting the secrets</a:t>
+            </a:r>
+          </a:p>
+          <a:p>
+            <a:r>
+              <a:rPr lang="en-US" sz="900" dirty="0"/>
+              <a:t>Azure Key Vault</a:t>
+            </a:r>
+          </a:p>
+          <a:p>
+            <a:pPr lvl="1"/>
+            <a:r>
+              <a:rPr lang="en-US" sz="900" dirty="0"/>
+              <a:t>What it is and how to access</a:t>
+            </a:r>
+          </a:p>
+          <a:p>
+            <a:r>
+              <a:rPr lang="en-US" sz="900" dirty="0"/>
+              <a:t>How to flatten the Json structure in Env(__) and others with (</a:t>
+            </a:r>
+            <a:r>
+              <a:rPr lang="en-US" sz="900" dirty="0">
+                <a:sym typeface="Wingdings" panose="05000000000000000000" pitchFamily="2" charset="2"/>
+              </a:rPr>
+              <a:t>)</a:t>
+            </a:r>
+          </a:p>
+          <a:p>
+            <a:r>
+              <a:rPr lang="en-US" sz="900" dirty="0"/>
+              <a:t>Use Binding to Map a POCO</a:t>
+            </a:r>
+          </a:p>
+          <a:p>
+            <a:pPr lvl="1"/>
+            <a:r>
+              <a:rPr lang="en-US" sz="900" dirty="0"/>
+              <a:t>Get </a:t>
+            </a:r>
+            <a:r>
+              <a:rPr lang="en-US" sz="900" dirty="0" err="1"/>
+              <a:t>ConnectionString</a:t>
+            </a:r>
+            <a:endParaRPr lang="en-US" sz="900" dirty="0"/>
+          </a:p>
+          <a:p>
+            <a:r>
+              <a:rPr lang="en-US" sz="900" dirty="0"/>
+              <a:t>Asp.net core</a:t>
+            </a:r>
+          </a:p>
+          <a:p>
+            <a:pPr lvl="1"/>
+            <a:r>
+              <a:rPr lang="en-US" sz="900" dirty="0">
+                <a:hlinkClick r:id="rId3"/>
+              </a:rPr>
+              <a:t>Azure Key Vault configuration provider in ASP.NET Core | Microsoft Docs</a:t>
+            </a:r>
+            <a:endParaRPr lang="en-US" sz="900" dirty="0"/>
+          </a:p>
+          <a:p>
+            <a:r>
+              <a:rPr lang="en-US" sz="900" dirty="0">
+                <a:hlinkClick r:id="rId4"/>
+              </a:rPr>
+              <a:t>https://docs.microsoft.com/en-us/dotnet/core/extensions/configuration</a:t>
+            </a:r>
+            <a:endParaRPr lang="en-US" sz="900" dirty="0"/>
+          </a:p>
+          <a:p>
+            <a:pPr lvl="1"/>
+            <a:r>
+              <a:rPr lang="en-US" sz="900" dirty="0" err="1"/>
+              <a:t>CreateDefaultBuilder</a:t>
+            </a:r>
+            <a:r>
+              <a:rPr lang="en-US" sz="900" dirty="0"/>
+              <a:t>(</a:t>
+            </a:r>
+            <a:r>
+              <a:rPr lang="en-US" sz="900" dirty="0" err="1"/>
+              <a:t>args</a:t>
+            </a:r>
+            <a:r>
+              <a:rPr lang="en-US" sz="900" dirty="0"/>
+              <a:t>)</a:t>
+            </a:r>
+          </a:p>
+          <a:p>
+            <a:r>
+              <a:rPr lang="en-US" sz="900" dirty="0"/>
+              <a:t>Chaining</a:t>
+            </a:r>
+          </a:p>
+          <a:p>
+            <a:r>
+              <a:rPr lang="en-US" sz="900" dirty="0"/>
+              <a:t>Binding</a:t>
+            </a:r>
+          </a:p>
+          <a:p>
+            <a:r>
+              <a:rPr lang="en-US" sz="900" dirty="0">
+                <a:hlinkClick r:id="rId5"/>
+              </a:rPr>
+              <a:t>Dependency injection in .NET | Microsoft Docs</a:t>
+            </a:r>
+            <a:endParaRPr lang="en-US" sz="900" dirty="0"/>
+          </a:p>
+          <a:p>
+            <a:r>
+              <a:rPr lang="en-US" sz="900" dirty="0">
+                <a:hlinkClick r:id="rId6"/>
+              </a:rPr>
+              <a:t>Use dependency injection in .NET | Microsoft Docs</a:t>
+            </a:r>
+            <a:endParaRPr lang="en-US" sz="900" dirty="0"/>
+          </a:p>
+          <a:p>
+            <a:r>
+              <a:rPr lang="nl-NL" sz="900" dirty="0">
+                <a:hlinkClick r:id="rId7"/>
+              </a:rPr>
+              <a:t>.NET Generic Host | Microsoft Docs</a:t>
+            </a:r>
+            <a:endParaRPr lang="en-US" sz="900" dirty="0"/>
+          </a:p>
+          <a:p>
+            <a:r>
+              <a:rPr lang="en-US" sz="800" dirty="0">
+                <a:hlinkClick r:id="rId8"/>
+              </a:rPr>
+              <a:t>Tutorial - Use Azure Key Vault with a virtual machine in .NET | Microsoft Docs</a:t>
+            </a:r>
+            <a:endParaRPr lang="en-US" sz="800" dirty="0"/>
+          </a:p>
+          <a:p>
+            <a:r>
+              <a:rPr lang="en-US" sz="800">
+                <a:hlinkClick r:id="rId9"/>
+              </a:rPr>
+              <a:t>Configuration providers in .NET | Microsoft Docs</a:t>
+            </a:r>
+            <a:endParaRPr lang="en-US" sz="900" dirty="0"/>
           </a:p>
         </p:txBody>
       </p:sp>
+      <p:grpSp>
+        <p:nvGrpSpPr>
+          <p:cNvPr id="10" name="Group 9">
+            <a:extLst>
+              <a:ext uri="{FF2B5EF4-FFF2-40B4-BE49-F238E27FC236}">
+                <a16:creationId xmlns:a16="http://schemas.microsoft.com/office/drawing/2014/main" id="{0A30B600-877F-7746-B57D-25C3B476FE7A}"/>
+              </a:ext>
+              <a:ext uri="{C183D7F6-B498-43B3-948B-1728B52AA6E4}">
+                <adec:decorative xmlns:adec="http://schemas.microsoft.com/office/drawing/2017/decorative" val="1"/>
+              </a:ext>
+            </a:extLst>
+          </p:cNvPr>
+          <p:cNvGrpSpPr>
+            <a:grpSpLocks noGrp="1" noUngrp="1" noRot="1" noChangeAspect="1" noMove="1" noResize="1"/>
+          </p:cNvGrpSpPr>
+          <p:nvPr>
+            <p:extLst>
+              <p:ext uri="{386F3935-93C4-4BCD-93E2-E3B085C9AB24}">
+                <p16:designElem xmlns:p16="http://schemas.microsoft.com/office/powerpoint/2015/main" val="1"/>
+              </p:ext>
+            </p:extLst>
+          </p:nvPr>
+        </p:nvGrpSpPr>
+        <p:grpSpPr>
+          <a:xfrm>
+            <a:off x="10290315" y="0"/>
+            <a:ext cx="1901686" cy="6858000"/>
+            <a:chOff x="10290315" y="0"/>
+            <a:chExt cx="1901686" cy="6858000"/>
+          </a:xfrm>
+        </p:grpSpPr>
+        <p:sp>
+          <p:nvSpPr>
+            <p:cNvPr id="11" name="Freeform 43">
+              <a:extLst>
+                <a:ext uri="{FF2B5EF4-FFF2-40B4-BE49-F238E27FC236}">
+                  <a16:creationId xmlns:a16="http://schemas.microsoft.com/office/drawing/2014/main" id="{2C3F9BC4-CA61-1545-AFCA-2998DE0A8129}"/>
+                </a:ext>
+                <a:ext uri="{C183D7F6-B498-43B3-948B-1728B52AA6E4}">
+                  <adec:decorative xmlns:adec="http://schemas.microsoft.com/office/drawing/2017/decorative" val="1"/>
+                </a:ext>
+              </a:extLst>
+            </p:cNvPr>
+            <p:cNvSpPr/>
+            <p:nvPr>
+              <p:extLst>
+                <p:ext uri="{386F3935-93C4-4BCD-93E2-E3B085C9AB24}">
+                  <p16:designElem xmlns:p16="http://schemas.microsoft.com/office/powerpoint/2015/main" val="1"/>
+                </p:ext>
+              </p:extLst>
+            </p:nvPr>
+          </p:nvSpPr>
+          <p:spPr>
+            <a:xfrm>
+              <a:off x="10290315" y="0"/>
+              <a:ext cx="1130724" cy="565573"/>
+            </a:xfrm>
+            <a:custGeom>
+              <a:avLst/>
+              <a:gdLst>
+                <a:gd name="connsiteX0" fmla="*/ 21 w 1130724"/>
+                <a:gd name="connsiteY0" fmla="*/ 0 h 565573"/>
+                <a:gd name="connsiteX1" fmla="*/ 1130703 w 1130724"/>
+                <a:gd name="connsiteY1" fmla="*/ 0 h 565573"/>
+                <a:gd name="connsiteX2" fmla="*/ 1130724 w 1130724"/>
+                <a:gd name="connsiteY2" fmla="*/ 211 h 565573"/>
+                <a:gd name="connsiteX3" fmla="*/ 565362 w 1130724"/>
+                <a:gd name="connsiteY3" fmla="*/ 565573 h 565573"/>
+                <a:gd name="connsiteX4" fmla="*/ 0 w 1130724"/>
+                <a:gd name="connsiteY4" fmla="*/ 211 h 565573"/>
+              </a:gdLst>
+              <a:ahLst/>
+              <a:cxnLst>
+                <a:cxn ang="0">
+                  <a:pos x="connsiteX0" y="connsiteY0"/>
+                </a:cxn>
+                <a:cxn ang="0">
+                  <a:pos x="connsiteX1" y="connsiteY1"/>
+                </a:cxn>
+                <a:cxn ang="0">
+                  <a:pos x="connsiteX2" y="connsiteY2"/>
+                </a:cxn>
+                <a:cxn ang="0">
+                  <a:pos x="connsiteX3" y="connsiteY3"/>
+                </a:cxn>
+                <a:cxn ang="0">
+                  <a:pos x="connsiteX4" y="connsiteY4"/>
+                </a:cxn>
+              </a:cxnLst>
+              <a:rect l="l" t="t" r="r" b="b"/>
+              <a:pathLst>
+                <a:path w="1130724" h="565573">
+                  <a:moveTo>
+                    <a:pt x="21" y="0"/>
+                  </a:moveTo>
+                  <a:lnTo>
+                    <a:pt x="1130703" y="0"/>
+                  </a:lnTo>
+                  <a:lnTo>
+                    <a:pt x="1130724" y="211"/>
+                  </a:lnTo>
+                  <a:cubicBezTo>
+                    <a:pt x="1130724" y="312452"/>
+                    <a:pt x="877603" y="565573"/>
+                    <a:pt x="565362" y="565573"/>
+                  </a:cubicBezTo>
+                  <a:cubicBezTo>
+                    <a:pt x="253121" y="565573"/>
+                    <a:pt x="0" y="312452"/>
+                    <a:pt x="0" y="211"/>
+                  </a:cubicBezTo>
+                  <a:close/>
+                </a:path>
+              </a:pathLst>
+            </a:custGeom>
+            <a:solidFill>
+              <a:schemeClr val="bg2"/>
+            </a:solidFill>
+            <a:ln>
+              <a:noFill/>
+            </a:ln>
+          </p:spPr>
+          <p:style>
+            <a:lnRef idx="2">
+              <a:schemeClr val="accent1">
+                <a:shade val="50000"/>
+              </a:schemeClr>
+            </a:lnRef>
+            <a:fillRef idx="1">
+              <a:schemeClr val="accent1"/>
+            </a:fillRef>
+            <a:effectRef idx="0">
+              <a:schemeClr val="accent1"/>
+            </a:effectRef>
+            <a:fontRef idx="minor">
+              <a:schemeClr val="lt1"/>
+            </a:fontRef>
+          </p:style>
+          <p:txBody>
+            <a:bodyPr wrap="square" rtlCol="0" anchor="ctr">
+              <a:noAutofit/>
+            </a:bodyPr>
+            <a:lstStyle/>
+            <a:p>
+              <a:pPr algn="ctr"/>
+              <a:endParaRPr lang="en-US"/>
+            </a:p>
+          </p:txBody>
+        </p:sp>
+        <p:sp>
+          <p:nvSpPr>
+            <p:cNvPr id="12" name="Freeform 44">
+              <a:extLst>
+                <a:ext uri="{FF2B5EF4-FFF2-40B4-BE49-F238E27FC236}">
+                  <a16:creationId xmlns:a16="http://schemas.microsoft.com/office/drawing/2014/main" id="{6DF9667B-A221-FF48-BE03-0BCECE0271CA}"/>
+                </a:ext>
+                <a:ext uri="{C183D7F6-B498-43B3-948B-1728B52AA6E4}">
+                  <adec:decorative xmlns:adec="http://schemas.microsoft.com/office/drawing/2017/decorative" val="1"/>
+                </a:ext>
+              </a:extLst>
+            </p:cNvPr>
+            <p:cNvSpPr/>
+            <p:nvPr>
+              <p:extLst>
+                <p:ext uri="{386F3935-93C4-4BCD-93E2-E3B085C9AB24}">
+                  <p16:designElem xmlns:p16="http://schemas.microsoft.com/office/powerpoint/2015/main" val="1"/>
+                </p:ext>
+              </p:extLst>
+            </p:nvPr>
+          </p:nvSpPr>
+          <p:spPr>
+            <a:xfrm>
+              <a:off x="11653180" y="6295093"/>
+              <a:ext cx="538821" cy="562907"/>
+            </a:xfrm>
+            <a:custGeom>
+              <a:avLst/>
+              <a:gdLst>
+                <a:gd name="connsiteX0" fmla="*/ 538821 w 538821"/>
+                <a:gd name="connsiteY0" fmla="*/ 0 h 562907"/>
+                <a:gd name="connsiteX1" fmla="*/ 538821 w 538821"/>
+                <a:gd name="connsiteY1" fmla="*/ 562907 h 562907"/>
+                <a:gd name="connsiteX2" fmla="*/ 22 w 538821"/>
+                <a:gd name="connsiteY2" fmla="*/ 562907 h 562907"/>
+                <a:gd name="connsiteX3" fmla="*/ 0 w 538821"/>
+                <a:gd name="connsiteY3" fmla="*/ 562686 h 562907"/>
+                <a:gd name="connsiteX4" fmla="*/ 451422 w 538821"/>
+                <a:gd name="connsiteY4" fmla="*/ 8810 h 562907"/>
+              </a:gdLst>
+              <a:ahLst/>
+              <a:cxnLst>
+                <a:cxn ang="0">
+                  <a:pos x="connsiteX0" y="connsiteY0"/>
+                </a:cxn>
+                <a:cxn ang="0">
+                  <a:pos x="connsiteX1" y="connsiteY1"/>
+                </a:cxn>
+                <a:cxn ang="0">
+                  <a:pos x="connsiteX2" y="connsiteY2"/>
+                </a:cxn>
+                <a:cxn ang="0">
+                  <a:pos x="connsiteX3" y="connsiteY3"/>
+                </a:cxn>
+                <a:cxn ang="0">
+                  <a:pos x="connsiteX4" y="connsiteY4"/>
+                </a:cxn>
+              </a:cxnLst>
+              <a:rect l="l" t="t" r="r" b="b"/>
+              <a:pathLst>
+                <a:path w="538821" h="562907">
+                  <a:moveTo>
+                    <a:pt x="538821" y="0"/>
+                  </a:moveTo>
+                  <a:lnTo>
+                    <a:pt x="538821" y="562907"/>
+                  </a:lnTo>
+                  <a:lnTo>
+                    <a:pt x="22" y="562907"/>
+                  </a:lnTo>
+                  <a:lnTo>
+                    <a:pt x="0" y="562686"/>
+                  </a:lnTo>
+                  <a:cubicBezTo>
+                    <a:pt x="0" y="289475"/>
+                    <a:pt x="193796" y="61528"/>
+                    <a:pt x="451422" y="8810"/>
+                  </a:cubicBezTo>
+                  <a:close/>
+                </a:path>
+              </a:pathLst>
+            </a:custGeom>
+            <a:solidFill>
+              <a:schemeClr val="bg2"/>
+            </a:solidFill>
+            <a:ln>
+              <a:noFill/>
+            </a:ln>
+          </p:spPr>
+          <p:style>
+            <a:lnRef idx="2">
+              <a:schemeClr val="accent1">
+                <a:shade val="50000"/>
+              </a:schemeClr>
+            </a:lnRef>
+            <a:fillRef idx="1">
+              <a:schemeClr val="accent1"/>
+            </a:fillRef>
+            <a:effectRef idx="0">
+              <a:schemeClr val="accent1"/>
+            </a:effectRef>
+            <a:fontRef idx="minor">
+              <a:schemeClr val="lt1"/>
+            </a:fontRef>
+          </p:style>
+          <p:txBody>
+            <a:bodyPr wrap="square" rtlCol="0" anchor="ctr">
+              <a:noAutofit/>
+            </a:bodyPr>
+            <a:lstStyle/>
+            <a:p>
+              <a:pPr algn="ctr"/>
+              <a:endParaRPr lang="en-US"/>
+            </a:p>
+          </p:txBody>
+        </p:sp>
+        <p:sp>
+          <p:nvSpPr>
+            <p:cNvPr id="13" name="Freeform 45">
+              <a:extLst>
+                <a:ext uri="{FF2B5EF4-FFF2-40B4-BE49-F238E27FC236}">
+                  <a16:creationId xmlns:a16="http://schemas.microsoft.com/office/drawing/2014/main" id="{B043781C-7B99-5E41-ACB6-43554D9E340B}"/>
+                </a:ext>
+                <a:ext uri="{C183D7F6-B498-43B3-948B-1728B52AA6E4}">
+                  <adec:decorative xmlns:adec="http://schemas.microsoft.com/office/drawing/2017/decorative" val="1"/>
+                </a:ext>
+              </a:extLst>
+            </p:cNvPr>
+            <p:cNvSpPr/>
+            <p:nvPr>
+              <p:extLst>
+                <p:ext uri="{386F3935-93C4-4BCD-93E2-E3B085C9AB24}">
+                  <p16:designElem xmlns:p16="http://schemas.microsoft.com/office/powerpoint/2015/main" val="1"/>
+                </p:ext>
+              </p:extLst>
+            </p:nvPr>
+          </p:nvSpPr>
+          <p:spPr>
+            <a:xfrm>
+              <a:off x="11653180" y="3552066"/>
+              <a:ext cx="538821" cy="1125373"/>
+            </a:xfrm>
+            <a:custGeom>
+              <a:avLst/>
+              <a:gdLst>
+                <a:gd name="connsiteX0" fmla="*/ 538821 w 538821"/>
+                <a:gd name="connsiteY0" fmla="*/ 0 h 1125373"/>
+                <a:gd name="connsiteX1" fmla="*/ 538821 w 538821"/>
+                <a:gd name="connsiteY1" fmla="*/ 1125373 h 1125373"/>
+                <a:gd name="connsiteX2" fmla="*/ 451422 w 538821"/>
+                <a:gd name="connsiteY2" fmla="*/ 1116562 h 1125373"/>
+                <a:gd name="connsiteX3" fmla="*/ 0 w 538821"/>
+                <a:gd name="connsiteY3" fmla="*/ 562686 h 1125373"/>
+                <a:gd name="connsiteX4" fmla="*/ 451422 w 538821"/>
+                <a:gd name="connsiteY4" fmla="*/ 8810 h 1125373"/>
+              </a:gdLst>
+              <a:ahLst/>
+              <a:cxnLst>
+                <a:cxn ang="0">
+                  <a:pos x="connsiteX0" y="connsiteY0"/>
+                </a:cxn>
+                <a:cxn ang="0">
+                  <a:pos x="connsiteX1" y="connsiteY1"/>
+                </a:cxn>
+                <a:cxn ang="0">
+                  <a:pos x="connsiteX2" y="connsiteY2"/>
+                </a:cxn>
+                <a:cxn ang="0">
+                  <a:pos x="connsiteX3" y="connsiteY3"/>
+                </a:cxn>
+                <a:cxn ang="0">
+                  <a:pos x="connsiteX4" y="connsiteY4"/>
+                </a:cxn>
+              </a:cxnLst>
+              <a:rect l="l" t="t" r="r" b="b"/>
+              <a:pathLst>
+                <a:path w="538821" h="1125373">
+                  <a:moveTo>
+                    <a:pt x="538821" y="0"/>
+                  </a:moveTo>
+                  <a:lnTo>
+                    <a:pt x="538821" y="1125373"/>
+                  </a:lnTo>
+                  <a:lnTo>
+                    <a:pt x="451422" y="1116562"/>
+                  </a:lnTo>
+                  <a:cubicBezTo>
+                    <a:pt x="193796" y="1063844"/>
+                    <a:pt x="0" y="835897"/>
+                    <a:pt x="0" y="562686"/>
+                  </a:cubicBezTo>
+                  <a:cubicBezTo>
+                    <a:pt x="0" y="289475"/>
+                    <a:pt x="193796" y="61528"/>
+                    <a:pt x="451422" y="8810"/>
+                  </a:cubicBezTo>
+                  <a:close/>
+                </a:path>
+              </a:pathLst>
+            </a:custGeom>
+            <a:solidFill>
+              <a:schemeClr val="bg2"/>
+            </a:solidFill>
+            <a:ln>
+              <a:noFill/>
+            </a:ln>
+          </p:spPr>
+          <p:style>
+            <a:lnRef idx="2">
+              <a:schemeClr val="accent1">
+                <a:shade val="50000"/>
+              </a:schemeClr>
+            </a:lnRef>
+            <a:fillRef idx="1">
+              <a:schemeClr val="accent1"/>
+            </a:fillRef>
+            <a:effectRef idx="0">
+              <a:schemeClr val="accent1"/>
+            </a:effectRef>
+            <a:fontRef idx="minor">
+              <a:schemeClr val="lt1"/>
+            </a:fontRef>
+          </p:style>
+          <p:txBody>
+            <a:bodyPr wrap="square" rtlCol="0" anchor="ctr">
+              <a:noAutofit/>
+            </a:bodyPr>
+            <a:lstStyle/>
+            <a:p>
+              <a:pPr algn="ctr"/>
+              <a:endParaRPr lang="en-US"/>
+            </a:p>
+          </p:txBody>
+        </p:sp>
+        <p:sp>
+          <p:nvSpPr>
+            <p:cNvPr id="14" name="Freeform 46">
+              <a:extLst>
+                <a:ext uri="{FF2B5EF4-FFF2-40B4-BE49-F238E27FC236}">
+                  <a16:creationId xmlns:a16="http://schemas.microsoft.com/office/drawing/2014/main" id="{24D64776-7D03-D04E-9D4F-4913424D1AC0}"/>
+                </a:ext>
+                <a:ext uri="{C183D7F6-B498-43B3-948B-1728B52AA6E4}">
+                  <adec:decorative xmlns:adec="http://schemas.microsoft.com/office/drawing/2017/decorative" val="1"/>
+                </a:ext>
+              </a:extLst>
+            </p:cNvPr>
+            <p:cNvSpPr/>
+            <p:nvPr>
+              <p:extLst>
+                <p:ext uri="{386F3935-93C4-4BCD-93E2-E3B085C9AB24}">
+                  <p16:designElem xmlns:p16="http://schemas.microsoft.com/office/powerpoint/2015/main" val="1"/>
+                </p:ext>
+              </p:extLst>
+            </p:nvPr>
+          </p:nvSpPr>
+          <p:spPr>
+            <a:xfrm>
+              <a:off x="11653180" y="2180552"/>
+              <a:ext cx="538821" cy="1125373"/>
+            </a:xfrm>
+            <a:custGeom>
+              <a:avLst/>
+              <a:gdLst>
+                <a:gd name="connsiteX0" fmla="*/ 538821 w 538821"/>
+                <a:gd name="connsiteY0" fmla="*/ 0 h 1125373"/>
+                <a:gd name="connsiteX1" fmla="*/ 538821 w 538821"/>
+                <a:gd name="connsiteY1" fmla="*/ 1125373 h 1125373"/>
+                <a:gd name="connsiteX2" fmla="*/ 451422 w 538821"/>
+                <a:gd name="connsiteY2" fmla="*/ 1116562 h 1125373"/>
+                <a:gd name="connsiteX3" fmla="*/ 0 w 538821"/>
+                <a:gd name="connsiteY3" fmla="*/ 562686 h 1125373"/>
+                <a:gd name="connsiteX4" fmla="*/ 451422 w 538821"/>
+                <a:gd name="connsiteY4" fmla="*/ 8810 h 1125373"/>
+              </a:gdLst>
+              <a:ahLst/>
+              <a:cxnLst>
+                <a:cxn ang="0">
+                  <a:pos x="connsiteX0" y="connsiteY0"/>
+                </a:cxn>
+                <a:cxn ang="0">
+                  <a:pos x="connsiteX1" y="connsiteY1"/>
+                </a:cxn>
+                <a:cxn ang="0">
+                  <a:pos x="connsiteX2" y="connsiteY2"/>
+                </a:cxn>
+                <a:cxn ang="0">
+                  <a:pos x="connsiteX3" y="connsiteY3"/>
+                </a:cxn>
+                <a:cxn ang="0">
+                  <a:pos x="connsiteX4" y="connsiteY4"/>
+                </a:cxn>
+              </a:cxnLst>
+              <a:rect l="l" t="t" r="r" b="b"/>
+              <a:pathLst>
+                <a:path w="538821" h="1125373">
+                  <a:moveTo>
+                    <a:pt x="538821" y="0"/>
+                  </a:moveTo>
+                  <a:lnTo>
+                    <a:pt x="538821" y="1125373"/>
+                  </a:lnTo>
+                  <a:lnTo>
+                    <a:pt x="451422" y="1116562"/>
+                  </a:lnTo>
+                  <a:cubicBezTo>
+                    <a:pt x="193796" y="1063844"/>
+                    <a:pt x="0" y="835897"/>
+                    <a:pt x="0" y="562686"/>
+                  </a:cubicBezTo>
+                  <a:cubicBezTo>
+                    <a:pt x="0" y="289475"/>
+                    <a:pt x="193796" y="61528"/>
+                    <a:pt x="451422" y="8810"/>
+                  </a:cubicBezTo>
+                  <a:close/>
+                </a:path>
+              </a:pathLst>
+            </a:custGeom>
+            <a:solidFill>
+              <a:schemeClr val="bg2"/>
+            </a:solidFill>
+            <a:ln>
+              <a:noFill/>
+            </a:ln>
+          </p:spPr>
+          <p:style>
+            <a:lnRef idx="2">
+              <a:schemeClr val="accent1">
+                <a:shade val="50000"/>
+              </a:schemeClr>
+            </a:lnRef>
+            <a:fillRef idx="1">
+              <a:schemeClr val="accent1"/>
+            </a:fillRef>
+            <a:effectRef idx="0">
+              <a:schemeClr val="accent1"/>
+            </a:effectRef>
+            <a:fontRef idx="minor">
+              <a:schemeClr val="lt1"/>
+            </a:fontRef>
+          </p:style>
+          <p:txBody>
+            <a:bodyPr wrap="square" rtlCol="0" anchor="ctr">
+              <a:noAutofit/>
+            </a:bodyPr>
+            <a:lstStyle/>
+            <a:p>
+              <a:pPr algn="ctr"/>
+              <a:endParaRPr lang="en-US"/>
+            </a:p>
+          </p:txBody>
+        </p:sp>
+        <p:sp>
+          <p:nvSpPr>
+            <p:cNvPr id="15" name="Freeform 47">
+              <a:extLst>
+                <a:ext uri="{FF2B5EF4-FFF2-40B4-BE49-F238E27FC236}">
+                  <a16:creationId xmlns:a16="http://schemas.microsoft.com/office/drawing/2014/main" id="{84D49EAC-E325-E74E-9875-A5B09696F6E3}"/>
+                </a:ext>
+                <a:ext uri="{C183D7F6-B498-43B3-948B-1728B52AA6E4}">
+                  <adec:decorative xmlns:adec="http://schemas.microsoft.com/office/drawing/2017/decorative" val="1"/>
+                </a:ext>
+              </a:extLst>
+            </p:cNvPr>
+            <p:cNvSpPr/>
+            <p:nvPr>
+              <p:extLst>
+                <p:ext uri="{386F3935-93C4-4BCD-93E2-E3B085C9AB24}">
+                  <p16:designElem xmlns:p16="http://schemas.microsoft.com/office/powerpoint/2015/main" val="1"/>
+                </p:ext>
+              </p:extLst>
+            </p:nvPr>
+          </p:nvSpPr>
+          <p:spPr>
+            <a:xfrm>
+              <a:off x="11653180" y="809039"/>
+              <a:ext cx="538821" cy="1125373"/>
+            </a:xfrm>
+            <a:custGeom>
+              <a:avLst/>
+              <a:gdLst>
+                <a:gd name="connsiteX0" fmla="*/ 538821 w 538821"/>
+                <a:gd name="connsiteY0" fmla="*/ 0 h 1125373"/>
+                <a:gd name="connsiteX1" fmla="*/ 538821 w 538821"/>
+                <a:gd name="connsiteY1" fmla="*/ 1125373 h 1125373"/>
+                <a:gd name="connsiteX2" fmla="*/ 451422 w 538821"/>
+                <a:gd name="connsiteY2" fmla="*/ 1116562 h 1125373"/>
+                <a:gd name="connsiteX3" fmla="*/ 0 w 538821"/>
+                <a:gd name="connsiteY3" fmla="*/ 562686 h 1125373"/>
+                <a:gd name="connsiteX4" fmla="*/ 451422 w 538821"/>
+                <a:gd name="connsiteY4" fmla="*/ 8810 h 1125373"/>
+              </a:gdLst>
+              <a:ahLst/>
+              <a:cxnLst>
+                <a:cxn ang="0">
+                  <a:pos x="connsiteX0" y="connsiteY0"/>
+                </a:cxn>
+                <a:cxn ang="0">
+                  <a:pos x="connsiteX1" y="connsiteY1"/>
+                </a:cxn>
+                <a:cxn ang="0">
+                  <a:pos x="connsiteX2" y="connsiteY2"/>
+                </a:cxn>
+                <a:cxn ang="0">
+                  <a:pos x="connsiteX3" y="connsiteY3"/>
+                </a:cxn>
+                <a:cxn ang="0">
+                  <a:pos x="connsiteX4" y="connsiteY4"/>
+                </a:cxn>
+              </a:cxnLst>
+              <a:rect l="l" t="t" r="r" b="b"/>
+              <a:pathLst>
+                <a:path w="538821" h="1125373">
+                  <a:moveTo>
+                    <a:pt x="538821" y="0"/>
+                  </a:moveTo>
+                  <a:lnTo>
+                    <a:pt x="538821" y="1125373"/>
+                  </a:lnTo>
+                  <a:lnTo>
+                    <a:pt x="451422" y="1116562"/>
+                  </a:lnTo>
+                  <a:cubicBezTo>
+                    <a:pt x="193796" y="1063844"/>
+                    <a:pt x="0" y="835897"/>
+                    <a:pt x="0" y="562686"/>
+                  </a:cubicBezTo>
+                  <a:cubicBezTo>
+                    <a:pt x="0" y="289475"/>
+                    <a:pt x="193796" y="61528"/>
+                    <a:pt x="451422" y="8810"/>
+                  </a:cubicBezTo>
+                  <a:close/>
+                </a:path>
+              </a:pathLst>
+            </a:custGeom>
+            <a:solidFill>
+              <a:schemeClr val="accent1"/>
+            </a:solidFill>
+            <a:ln>
+              <a:noFill/>
+            </a:ln>
+          </p:spPr>
+          <p:style>
+            <a:lnRef idx="2">
+              <a:schemeClr val="accent1">
+                <a:shade val="50000"/>
+              </a:schemeClr>
+            </a:lnRef>
+            <a:fillRef idx="1">
+              <a:schemeClr val="accent1"/>
+            </a:fillRef>
+            <a:effectRef idx="0">
+              <a:schemeClr val="accent1"/>
+            </a:effectRef>
+            <a:fontRef idx="minor">
+              <a:schemeClr val="lt1"/>
+            </a:fontRef>
+          </p:style>
+          <p:txBody>
+            <a:bodyPr wrap="square" rtlCol="0" anchor="ctr">
+              <a:noAutofit/>
+            </a:bodyPr>
+            <a:lstStyle/>
+            <a:p>
+              <a:pPr algn="ctr"/>
+              <a:endParaRPr lang="en-US"/>
+            </a:p>
+          </p:txBody>
+        </p:sp>
+        <p:sp>
+          <p:nvSpPr>
+            <p:cNvPr id="16" name="Freeform 48">
+              <a:extLst>
+                <a:ext uri="{FF2B5EF4-FFF2-40B4-BE49-F238E27FC236}">
+                  <a16:creationId xmlns:a16="http://schemas.microsoft.com/office/drawing/2014/main" id="{A82CBB5F-9CE4-9F41-828D-030FF74ABE8D}"/>
+                </a:ext>
+                <a:ext uri="{C183D7F6-B498-43B3-948B-1728B52AA6E4}">
+                  <adec:decorative xmlns:adec="http://schemas.microsoft.com/office/drawing/2017/decorative" val="1"/>
+                </a:ext>
+              </a:extLst>
+            </p:cNvPr>
+            <p:cNvSpPr/>
+            <p:nvPr>
+              <p:extLst>
+                <p:ext uri="{386F3935-93C4-4BCD-93E2-E3B085C9AB24}">
+                  <p16:designElem xmlns:p16="http://schemas.microsoft.com/office/powerpoint/2015/main" val="1"/>
+                </p:ext>
+              </p:extLst>
+            </p:nvPr>
+          </p:nvSpPr>
+          <p:spPr>
+            <a:xfrm>
+              <a:off x="11653180" y="0"/>
+              <a:ext cx="538821" cy="562898"/>
+            </a:xfrm>
+            <a:custGeom>
+              <a:avLst/>
+              <a:gdLst>
+                <a:gd name="connsiteX0" fmla="*/ 21 w 538821"/>
+                <a:gd name="connsiteY0" fmla="*/ 0 h 562898"/>
+                <a:gd name="connsiteX1" fmla="*/ 538821 w 538821"/>
+                <a:gd name="connsiteY1" fmla="*/ 0 h 562898"/>
+                <a:gd name="connsiteX2" fmla="*/ 538821 w 538821"/>
+                <a:gd name="connsiteY2" fmla="*/ 562898 h 562898"/>
+                <a:gd name="connsiteX3" fmla="*/ 451422 w 538821"/>
+                <a:gd name="connsiteY3" fmla="*/ 554087 h 562898"/>
+                <a:gd name="connsiteX4" fmla="*/ 0 w 538821"/>
+                <a:gd name="connsiteY4" fmla="*/ 211 h 562898"/>
+              </a:gdLst>
+              <a:ahLst/>
+              <a:cxnLst>
+                <a:cxn ang="0">
+                  <a:pos x="connsiteX0" y="connsiteY0"/>
+                </a:cxn>
+                <a:cxn ang="0">
+                  <a:pos x="connsiteX1" y="connsiteY1"/>
+                </a:cxn>
+                <a:cxn ang="0">
+                  <a:pos x="connsiteX2" y="connsiteY2"/>
+                </a:cxn>
+                <a:cxn ang="0">
+                  <a:pos x="connsiteX3" y="connsiteY3"/>
+                </a:cxn>
+                <a:cxn ang="0">
+                  <a:pos x="connsiteX4" y="connsiteY4"/>
+                </a:cxn>
+              </a:cxnLst>
+              <a:rect l="l" t="t" r="r" b="b"/>
+              <a:pathLst>
+                <a:path w="538821" h="562898">
+                  <a:moveTo>
+                    <a:pt x="21" y="0"/>
+                  </a:moveTo>
+                  <a:lnTo>
+                    <a:pt x="538821" y="0"/>
+                  </a:lnTo>
+                  <a:lnTo>
+                    <a:pt x="538821" y="562898"/>
+                  </a:lnTo>
+                  <a:lnTo>
+                    <a:pt x="451422" y="554087"/>
+                  </a:lnTo>
+                  <a:cubicBezTo>
+                    <a:pt x="193796" y="501369"/>
+                    <a:pt x="0" y="273422"/>
+                    <a:pt x="0" y="211"/>
+                  </a:cubicBezTo>
+                  <a:close/>
+                </a:path>
+              </a:pathLst>
+            </a:custGeom>
+            <a:solidFill>
+              <a:schemeClr val="bg2"/>
+            </a:solidFill>
+            <a:ln>
+              <a:noFill/>
+            </a:ln>
+          </p:spPr>
+          <p:style>
+            <a:lnRef idx="2">
+              <a:schemeClr val="accent1">
+                <a:shade val="50000"/>
+              </a:schemeClr>
+            </a:lnRef>
+            <a:fillRef idx="1">
+              <a:schemeClr val="accent1"/>
+            </a:fillRef>
+            <a:effectRef idx="0">
+              <a:schemeClr val="accent1"/>
+            </a:effectRef>
+            <a:fontRef idx="minor">
+              <a:schemeClr val="lt1"/>
+            </a:fontRef>
+          </p:style>
+          <p:txBody>
+            <a:bodyPr wrap="square" rtlCol="0" anchor="ctr">
+              <a:noAutofit/>
+            </a:bodyPr>
+            <a:lstStyle/>
+            <a:p>
+              <a:pPr algn="ctr"/>
+              <a:endParaRPr lang="en-US"/>
+            </a:p>
+          </p:txBody>
+        </p:sp>
+      </p:grpSp>
+      <p:cxnSp>
+        <p:nvCxnSpPr>
+          <p:cNvPr id="18" name="Straight Connector 17">
+            <a:extLst>
+              <a:ext uri="{FF2B5EF4-FFF2-40B4-BE49-F238E27FC236}">
+                <a16:creationId xmlns:a16="http://schemas.microsoft.com/office/drawing/2014/main" id="{BE2AC807-9FDE-674F-84BF-EC319D683243}"/>
+              </a:ext>
+              <a:ext uri="{C183D7F6-B498-43B3-948B-1728B52AA6E4}">
+                <adec:decorative xmlns:adec="http://schemas.microsoft.com/office/drawing/2017/decorative" val="1"/>
+              </a:ext>
+            </a:extLst>
+          </p:cNvPr>
+          <p:cNvCxnSpPr>
+            <a:cxnSpLocks noGrp="1" noRot="1" noChangeAspect="1" noMove="1" noResize="1" noEditPoints="1" noAdjustHandles="1" noChangeArrowheads="1" noChangeShapeType="1"/>
+          </p:cNvCxnSpPr>
+          <p:nvPr>
+            <p:extLst>
+              <p:ext uri="{386F3935-93C4-4BCD-93E2-E3B085C9AB24}">
+                <p16:designElem xmlns:p16="http://schemas.microsoft.com/office/powerpoint/2015/main" val="1"/>
+              </p:ext>
+            </p:extLst>
+          </p:nvPr>
+        </p:nvCxnSpPr>
+        <p:spPr>
+          <a:xfrm>
+            <a:off x="565150" y="6087110"/>
+            <a:ext cx="11058344" cy="0"/>
+          </a:xfrm>
+          <a:prstGeom prst="line">
+            <a:avLst/>
+          </a:prstGeom>
+          <a:ln w="12700">
+            <a:solidFill>
+              <a:schemeClr val="bg1">
+                <a:lumMod val="65000"/>
+              </a:schemeClr>
+            </a:solidFill>
+          </a:ln>
+        </p:spPr>
+        <p:style>
+          <a:lnRef idx="1">
+            <a:schemeClr val="accent1"/>
+          </a:lnRef>
+          <a:fillRef idx="0">
+            <a:schemeClr val="accent1"/>
+          </a:fillRef>
+          <a:effectRef idx="0">
+            <a:schemeClr val="accent1"/>
+          </a:effectRef>
+          <a:fontRef idx="minor">
+            <a:schemeClr val="tx1"/>
+          </a:fontRef>
+        </p:style>
+      </p:cxnSp>
     </p:spTree>
     <p:extLst>
       <p:ext uri="{BB962C8B-B14F-4D97-AF65-F5344CB8AC3E}">

</xml_diff>